<commit_message>
Attempt 1 at UI over Gmail
in this commit i try and fail to create code that overlays gmail based on text from a file. BIG L
</commit_message>
<xml_diff>
--- a/COMP 3000/Project Docs/Process diagram.pptx
+++ b/COMP 3000/Project Docs/Process diagram.pptx
@@ -6,6 +6,8 @@
   </p:sldMasterIdLst>
   <p:sldIdLst>
     <p:sldId id="256" r:id="rId2"/>
+    <p:sldId id="257" r:id="rId3"/>
+    <p:sldId id="258" r:id="rId4"/>
   </p:sldIdLst>
   <p:sldSz cx="12192000" cy="6858000"/>
   <p:notesSz cx="6858000" cy="9144000"/>
@@ -104,6 +106,11 @@
       </a:defRPr>
     </a:lvl9pPr>
   </p:defaultTextStyle>
+  <p:extLst>
+    <p:ext uri="{EFAFB233-063F-42B5-8137-9DF3F51BA10A}">
+      <p15:sldGuideLst xmlns:p15="http://schemas.microsoft.com/office/powerpoint/2012/main"/>
+    </p:ext>
+  </p:extLst>
 </p:presentation>
 </file>
 
@@ -256,7 +263,7 @@
           <a:p>
             <a:fld id="{E239C3FF-4299-45FA-A552-BB98A650FEDD}" type="datetimeFigureOut">
               <a:rPr lang="en-GB" smtClean="0"/>
-              <a:t>07/11/2025</a:t>
+              <a:t>18/11/2025</a:t>
             </a:fld>
             <a:endParaRPr lang="en-GB"/>
           </a:p>
@@ -456,7 +463,7 @@
           <a:p>
             <a:fld id="{E239C3FF-4299-45FA-A552-BB98A650FEDD}" type="datetimeFigureOut">
               <a:rPr lang="en-GB" smtClean="0"/>
-              <a:t>07/11/2025</a:t>
+              <a:t>18/11/2025</a:t>
             </a:fld>
             <a:endParaRPr lang="en-GB"/>
           </a:p>
@@ -666,7 +673,7 @@
           <a:p>
             <a:fld id="{E239C3FF-4299-45FA-A552-BB98A650FEDD}" type="datetimeFigureOut">
               <a:rPr lang="en-GB" smtClean="0"/>
-              <a:t>07/11/2025</a:t>
+              <a:t>18/11/2025</a:t>
             </a:fld>
             <a:endParaRPr lang="en-GB"/>
           </a:p>
@@ -866,7 +873,7 @@
           <a:p>
             <a:fld id="{E239C3FF-4299-45FA-A552-BB98A650FEDD}" type="datetimeFigureOut">
               <a:rPr lang="en-GB" smtClean="0"/>
-              <a:t>07/11/2025</a:t>
+              <a:t>18/11/2025</a:t>
             </a:fld>
             <a:endParaRPr lang="en-GB"/>
           </a:p>
@@ -1142,7 +1149,7 @@
           <a:p>
             <a:fld id="{E239C3FF-4299-45FA-A552-BB98A650FEDD}" type="datetimeFigureOut">
               <a:rPr lang="en-GB" smtClean="0"/>
-              <a:t>07/11/2025</a:t>
+              <a:t>18/11/2025</a:t>
             </a:fld>
             <a:endParaRPr lang="en-GB"/>
           </a:p>
@@ -1410,7 +1417,7 @@
           <a:p>
             <a:fld id="{E239C3FF-4299-45FA-A552-BB98A650FEDD}" type="datetimeFigureOut">
               <a:rPr lang="en-GB" smtClean="0"/>
-              <a:t>07/11/2025</a:t>
+              <a:t>18/11/2025</a:t>
             </a:fld>
             <a:endParaRPr lang="en-GB"/>
           </a:p>
@@ -1825,7 +1832,7 @@
           <a:p>
             <a:fld id="{E239C3FF-4299-45FA-A552-BB98A650FEDD}" type="datetimeFigureOut">
               <a:rPr lang="en-GB" smtClean="0"/>
-              <a:t>07/11/2025</a:t>
+              <a:t>18/11/2025</a:t>
             </a:fld>
             <a:endParaRPr lang="en-GB"/>
           </a:p>
@@ -1967,7 +1974,7 @@
           <a:p>
             <a:fld id="{E239C3FF-4299-45FA-A552-BB98A650FEDD}" type="datetimeFigureOut">
               <a:rPr lang="en-GB" smtClean="0"/>
-              <a:t>07/11/2025</a:t>
+              <a:t>18/11/2025</a:t>
             </a:fld>
             <a:endParaRPr lang="en-GB"/>
           </a:p>
@@ -2080,7 +2087,7 @@
           <a:p>
             <a:fld id="{E239C3FF-4299-45FA-A552-BB98A650FEDD}" type="datetimeFigureOut">
               <a:rPr lang="en-GB" smtClean="0"/>
-              <a:t>07/11/2025</a:t>
+              <a:t>18/11/2025</a:t>
             </a:fld>
             <a:endParaRPr lang="en-GB"/>
           </a:p>
@@ -2393,7 +2400,7 @@
           <a:p>
             <a:fld id="{E239C3FF-4299-45FA-A552-BB98A650FEDD}" type="datetimeFigureOut">
               <a:rPr lang="en-GB" smtClean="0"/>
-              <a:t>07/11/2025</a:t>
+              <a:t>18/11/2025</a:t>
             </a:fld>
             <a:endParaRPr lang="en-GB"/>
           </a:p>
@@ -2682,7 +2689,7 @@
           <a:p>
             <a:fld id="{E239C3FF-4299-45FA-A552-BB98A650FEDD}" type="datetimeFigureOut">
               <a:rPr lang="en-GB" smtClean="0"/>
-              <a:t>07/11/2025</a:t>
+              <a:t>18/11/2025</a:t>
             </a:fld>
             <a:endParaRPr lang="en-GB"/>
           </a:p>
@@ -2925,7 +2932,7 @@
           <a:p>
             <a:fld id="{E239C3FF-4299-45FA-A552-BB98A650FEDD}" type="datetimeFigureOut">
               <a:rPr lang="en-GB" smtClean="0"/>
-              <a:t>07/11/2025</a:t>
+              <a:t>18/11/2025</a:t>
             </a:fld>
             <a:endParaRPr lang="en-GB"/>
           </a:p>
@@ -4313,6 +4320,1401 @@
     <p:extLst>
       <p:ext uri="{BB962C8B-B14F-4D97-AF65-F5344CB8AC3E}">
         <p14:creationId xmlns:p14="http://schemas.microsoft.com/office/powerpoint/2010/main" val="538677856"/>
+      </p:ext>
+    </p:extLst>
+  </p:cSld>
+  <p:clrMapOvr>
+    <a:masterClrMapping/>
+  </p:clrMapOvr>
+</p:sld>
+</file>
+
+<file path=ppt/slides/slide2.xml><?xml version="1.0" encoding="utf-8"?>
+<p:sld xmlns:a="http://schemas.openxmlformats.org/drawingml/2006/main" xmlns:r="http://schemas.openxmlformats.org/officeDocument/2006/relationships" xmlns:p="http://schemas.openxmlformats.org/presentationml/2006/main">
+  <p:cSld>
+    <p:spTree>
+      <p:nvGrpSpPr>
+        <p:cNvPr id="1" name=""/>
+        <p:cNvGrpSpPr/>
+        <p:nvPr/>
+      </p:nvGrpSpPr>
+      <p:grpSpPr>
+        <a:xfrm>
+          <a:off x="0" y="0"/>
+          <a:ext cx="0" cy="0"/>
+          <a:chOff x="0" y="0"/>
+          <a:chExt cx="0" cy="0"/>
+        </a:xfrm>
+      </p:grpSpPr>
+      <p:grpSp>
+        <p:nvGrpSpPr>
+          <p:cNvPr id="23" name="Group 22">
+            <a:extLst>
+              <a:ext uri="{FF2B5EF4-FFF2-40B4-BE49-F238E27FC236}">
+                <a16:creationId xmlns:a16="http://schemas.microsoft.com/office/drawing/2014/main" id="{BD03B9EE-20D4-95E8-C5B5-11E5E94FFC95}"/>
+              </a:ext>
+            </a:extLst>
+          </p:cNvPr>
+          <p:cNvGrpSpPr/>
+          <p:nvPr/>
+        </p:nvGrpSpPr>
+        <p:grpSpPr>
+          <a:xfrm>
+            <a:off x="8622792" y="109728"/>
+            <a:ext cx="3253588" cy="1650913"/>
+            <a:chOff x="3758184" y="612648"/>
+            <a:chExt cx="4956047" cy="1527048"/>
+          </a:xfrm>
+        </p:grpSpPr>
+        <p:sp>
+          <p:nvSpPr>
+            <p:cNvPr id="9" name="Rectangle 8">
+              <a:extLst>
+                <a:ext uri="{FF2B5EF4-FFF2-40B4-BE49-F238E27FC236}">
+                  <a16:creationId xmlns:a16="http://schemas.microsoft.com/office/drawing/2014/main" id="{2E9F5A27-1442-D6D3-CBA9-B553A02D022F}"/>
+                </a:ext>
+              </a:extLst>
+            </p:cNvPr>
+            <p:cNvSpPr>
+              <a:spLocks/>
+            </p:cNvSpPr>
+            <p:nvPr/>
+          </p:nvSpPr>
+          <p:spPr>
+            <a:xfrm>
+              <a:off x="3758184" y="612648"/>
+              <a:ext cx="4791456" cy="1527048"/>
+            </a:xfrm>
+            <a:prstGeom prst="rect">
+              <a:avLst/>
+            </a:prstGeom>
+          </p:spPr>
+          <p:style>
+            <a:lnRef idx="2">
+              <a:schemeClr val="accent1">
+                <a:shade val="15000"/>
+              </a:schemeClr>
+            </a:lnRef>
+            <a:fillRef idx="1">
+              <a:schemeClr val="accent1"/>
+            </a:fillRef>
+            <a:effectRef idx="0">
+              <a:schemeClr val="accent1"/>
+            </a:effectRef>
+            <a:fontRef idx="minor">
+              <a:schemeClr val="lt1"/>
+            </a:fontRef>
+          </p:style>
+          <p:txBody>
+            <a:bodyPr rtlCol="0" anchor="ctr"/>
+            <a:lstStyle/>
+            <a:p>
+              <a:pPr algn="ctr"/>
+              <a:endParaRPr lang="en-GB"/>
+            </a:p>
+          </p:txBody>
+        </p:sp>
+        <p:sp>
+          <p:nvSpPr>
+            <p:cNvPr id="7" name="Rectangle 6">
+              <a:extLst>
+                <a:ext uri="{FF2B5EF4-FFF2-40B4-BE49-F238E27FC236}">
+                  <a16:creationId xmlns:a16="http://schemas.microsoft.com/office/drawing/2014/main" id="{8B677102-D002-F50C-767A-01BB46D50DFE}"/>
+                </a:ext>
+              </a:extLst>
+            </p:cNvPr>
+            <p:cNvSpPr>
+              <a:spLocks/>
+            </p:cNvSpPr>
+            <p:nvPr/>
+          </p:nvSpPr>
+          <p:spPr>
+            <a:xfrm>
+              <a:off x="4178808" y="979965"/>
+              <a:ext cx="1755648" cy="778192"/>
+            </a:xfrm>
+            <a:prstGeom prst="rect">
+              <a:avLst/>
+            </a:prstGeom>
+          </p:spPr>
+          <p:style>
+            <a:lnRef idx="2">
+              <a:schemeClr val="accent1">
+                <a:shade val="15000"/>
+              </a:schemeClr>
+            </a:lnRef>
+            <a:fillRef idx="1">
+              <a:schemeClr val="accent1"/>
+            </a:fillRef>
+            <a:effectRef idx="0">
+              <a:schemeClr val="accent1"/>
+            </a:effectRef>
+            <a:fontRef idx="minor">
+              <a:schemeClr val="lt1"/>
+            </a:fontRef>
+          </p:style>
+          <p:txBody>
+            <a:bodyPr rtlCol="0" anchor="ctr"/>
+            <a:lstStyle/>
+            <a:p>
+              <a:pPr algn="ctr"/>
+              <a:r>
+                <a:rPr lang="en-GB" dirty="0"/>
+                <a:t>AI processor</a:t>
+              </a:r>
+            </a:p>
+          </p:txBody>
+        </p:sp>
+        <p:sp>
+          <p:nvSpPr>
+            <p:cNvPr id="8" name="Rectangle 7">
+              <a:extLst>
+                <a:ext uri="{FF2B5EF4-FFF2-40B4-BE49-F238E27FC236}">
+                  <a16:creationId xmlns:a16="http://schemas.microsoft.com/office/drawing/2014/main" id="{38E7BC97-11C8-96A8-C91D-B4237F86C660}"/>
+                </a:ext>
+              </a:extLst>
+            </p:cNvPr>
+            <p:cNvSpPr>
+              <a:spLocks/>
+            </p:cNvSpPr>
+            <p:nvPr/>
+          </p:nvSpPr>
+          <p:spPr>
+            <a:xfrm>
+              <a:off x="6263640" y="950976"/>
+              <a:ext cx="1911096" cy="841248"/>
+            </a:xfrm>
+            <a:prstGeom prst="rect">
+              <a:avLst/>
+            </a:prstGeom>
+          </p:spPr>
+          <p:style>
+            <a:lnRef idx="2">
+              <a:schemeClr val="accent1">
+                <a:shade val="15000"/>
+              </a:schemeClr>
+            </a:lnRef>
+            <a:fillRef idx="1">
+              <a:schemeClr val="accent1"/>
+            </a:fillRef>
+            <a:effectRef idx="0">
+              <a:schemeClr val="accent1"/>
+            </a:effectRef>
+            <a:fontRef idx="minor">
+              <a:schemeClr val="lt1"/>
+            </a:fontRef>
+          </p:style>
+          <p:txBody>
+            <a:bodyPr rtlCol="0" anchor="ctr"/>
+            <a:lstStyle/>
+            <a:p>
+              <a:pPr algn="ctr"/>
+              <a:r>
+                <a:rPr lang="en-GB" dirty="0"/>
+                <a:t>API processor</a:t>
+              </a:r>
+            </a:p>
+          </p:txBody>
+        </p:sp>
+        <p:sp>
+          <p:nvSpPr>
+            <p:cNvPr id="10" name="TextBox 9">
+              <a:extLst>
+                <a:ext uri="{FF2B5EF4-FFF2-40B4-BE49-F238E27FC236}">
+                  <a16:creationId xmlns:a16="http://schemas.microsoft.com/office/drawing/2014/main" id="{9BC2BE69-B177-0CCF-B36A-4A5D053EB2B2}"/>
+                </a:ext>
+              </a:extLst>
+            </p:cNvPr>
+            <p:cNvSpPr txBox="1">
+              <a:spLocks/>
+            </p:cNvSpPr>
+            <p:nvPr/>
+          </p:nvSpPr>
+          <p:spPr>
+            <a:xfrm>
+              <a:off x="5119471" y="1758157"/>
+              <a:ext cx="3594760" cy="341622"/>
+            </a:xfrm>
+            <a:prstGeom prst="rect">
+              <a:avLst/>
+            </a:prstGeom>
+            <a:noFill/>
+          </p:spPr>
+          <p:txBody>
+            <a:bodyPr wrap="square" rtlCol="0">
+              <a:spAutoFit/>
+            </a:bodyPr>
+            <a:lstStyle/>
+            <a:p>
+              <a:r>
+                <a:rPr lang="en-GB" dirty="0"/>
+                <a:t>Risk Processor</a:t>
+              </a:r>
+            </a:p>
+          </p:txBody>
+        </p:sp>
+      </p:grpSp>
+      <p:sp>
+        <p:nvSpPr>
+          <p:cNvPr id="4" name="Rectangle 3">
+            <a:extLst>
+              <a:ext uri="{FF2B5EF4-FFF2-40B4-BE49-F238E27FC236}">
+                <a16:creationId xmlns:a16="http://schemas.microsoft.com/office/drawing/2014/main" id="{7AABF671-9F30-213F-C21E-BEDA5E660F4F}"/>
+              </a:ext>
+            </a:extLst>
+          </p:cNvPr>
+          <p:cNvSpPr/>
+          <p:nvPr/>
+        </p:nvSpPr>
+        <p:spPr>
+          <a:xfrm>
+            <a:off x="7975383" y="4534640"/>
+            <a:ext cx="1847088" cy="914400"/>
+          </a:xfrm>
+          <a:prstGeom prst="rect">
+            <a:avLst/>
+          </a:prstGeom>
+        </p:spPr>
+        <p:style>
+          <a:lnRef idx="2">
+            <a:schemeClr val="accent1">
+              <a:shade val="15000"/>
+            </a:schemeClr>
+          </a:lnRef>
+          <a:fillRef idx="1">
+            <a:schemeClr val="accent1"/>
+          </a:fillRef>
+          <a:effectRef idx="0">
+            <a:schemeClr val="accent1"/>
+          </a:effectRef>
+          <a:fontRef idx="minor">
+            <a:schemeClr val="lt1"/>
+          </a:fontRef>
+        </p:style>
+        <p:txBody>
+          <a:bodyPr rtlCol="0" anchor="ctr"/>
+          <a:lstStyle/>
+          <a:p>
+            <a:pPr algn="ctr"/>
+            <a:r>
+              <a:rPr lang="en-GB" dirty="0"/>
+              <a:t>Sheets Data </a:t>
+            </a:r>
+          </a:p>
+          <a:p>
+            <a:pPr algn="ctr"/>
+            <a:r>
+              <a:rPr lang="en-GB" sz="800" dirty="0"/>
+              <a:t>Non-volatile Memory R/W</a:t>
+            </a:r>
+            <a:endParaRPr lang="en-GB" dirty="0"/>
+          </a:p>
+        </p:txBody>
+      </p:sp>
+      <p:sp>
+        <p:nvSpPr>
+          <p:cNvPr id="5" name="Rectangle 4">
+            <a:extLst>
+              <a:ext uri="{FF2B5EF4-FFF2-40B4-BE49-F238E27FC236}">
+                <a16:creationId xmlns:a16="http://schemas.microsoft.com/office/drawing/2014/main" id="{026A9D27-A3F5-4CF7-869F-1DCF05F15E76}"/>
+              </a:ext>
+            </a:extLst>
+          </p:cNvPr>
+          <p:cNvSpPr/>
+          <p:nvPr/>
+        </p:nvSpPr>
+        <p:spPr>
+          <a:xfrm>
+            <a:off x="4385363" y="2103290"/>
+            <a:ext cx="1527048" cy="793148"/>
+          </a:xfrm>
+          <a:prstGeom prst="rect">
+            <a:avLst/>
+          </a:prstGeom>
+        </p:spPr>
+        <p:style>
+          <a:lnRef idx="2">
+            <a:schemeClr val="accent1">
+              <a:shade val="15000"/>
+            </a:schemeClr>
+          </a:lnRef>
+          <a:fillRef idx="1">
+            <a:schemeClr val="accent1"/>
+          </a:fillRef>
+          <a:effectRef idx="0">
+            <a:schemeClr val="accent1"/>
+          </a:effectRef>
+          <a:fontRef idx="minor">
+            <a:schemeClr val="lt1"/>
+          </a:fontRef>
+        </p:style>
+        <p:txBody>
+          <a:bodyPr rtlCol="0" anchor="ctr"/>
+          <a:lstStyle/>
+          <a:p>
+            <a:pPr algn="ctr"/>
+            <a:r>
+              <a:rPr lang="en-GB" dirty="0"/>
+              <a:t>Extension/UI</a:t>
+            </a:r>
+          </a:p>
+          <a:p>
+            <a:pPr algn="ctr"/>
+            <a:r>
+              <a:rPr lang="en-GB" sz="800" dirty="0"/>
+              <a:t>Volatile Memory</a:t>
+            </a:r>
+          </a:p>
+        </p:txBody>
+      </p:sp>
+      <p:sp>
+        <p:nvSpPr>
+          <p:cNvPr id="6" name="Rectangle 5">
+            <a:extLst>
+              <a:ext uri="{FF2B5EF4-FFF2-40B4-BE49-F238E27FC236}">
+                <a16:creationId xmlns:a16="http://schemas.microsoft.com/office/drawing/2014/main" id="{E5170D2D-514C-609B-1583-D1098EC7867D}"/>
+              </a:ext>
+            </a:extLst>
+          </p:cNvPr>
+          <p:cNvSpPr/>
+          <p:nvPr/>
+        </p:nvSpPr>
+        <p:spPr>
+          <a:xfrm>
+            <a:off x="4811268" y="4518326"/>
+            <a:ext cx="2020824" cy="841248"/>
+          </a:xfrm>
+          <a:prstGeom prst="rect">
+            <a:avLst/>
+          </a:prstGeom>
+        </p:spPr>
+        <p:style>
+          <a:lnRef idx="2">
+            <a:schemeClr val="accent1">
+              <a:shade val="15000"/>
+            </a:schemeClr>
+          </a:lnRef>
+          <a:fillRef idx="1">
+            <a:schemeClr val="accent1"/>
+          </a:fillRef>
+          <a:effectRef idx="0">
+            <a:schemeClr val="accent1"/>
+          </a:effectRef>
+          <a:fontRef idx="minor">
+            <a:schemeClr val="lt1"/>
+          </a:fontRef>
+        </p:style>
+        <p:txBody>
+          <a:bodyPr rtlCol="0" anchor="ctr"/>
+          <a:lstStyle/>
+          <a:p>
+            <a:pPr algn="ctr"/>
+            <a:r>
+              <a:rPr lang="en-GB" dirty="0"/>
+              <a:t>Google Script (Scrape_Email)</a:t>
+            </a:r>
+            <a:br>
+              <a:rPr lang="en-GB" dirty="0"/>
+            </a:br>
+            <a:r>
+              <a:rPr lang="en-GB" sz="800" dirty="0"/>
+              <a:t>Volatile Memory</a:t>
+            </a:r>
+            <a:endParaRPr lang="en-GB" dirty="0"/>
+          </a:p>
+        </p:txBody>
+      </p:sp>
+      <p:sp>
+        <p:nvSpPr>
+          <p:cNvPr id="11" name="Rectangle 10">
+            <a:extLst>
+              <a:ext uri="{FF2B5EF4-FFF2-40B4-BE49-F238E27FC236}">
+                <a16:creationId xmlns:a16="http://schemas.microsoft.com/office/drawing/2014/main" id="{9C7EA38B-AE89-7352-8F62-0BA9BB9E71AE}"/>
+              </a:ext>
+            </a:extLst>
+          </p:cNvPr>
+          <p:cNvSpPr/>
+          <p:nvPr/>
+        </p:nvSpPr>
+        <p:spPr>
+          <a:xfrm>
+            <a:off x="2002534" y="4538994"/>
+            <a:ext cx="1755648" cy="838867"/>
+          </a:xfrm>
+          <a:prstGeom prst="rect">
+            <a:avLst/>
+          </a:prstGeom>
+        </p:spPr>
+        <p:style>
+          <a:lnRef idx="2">
+            <a:schemeClr val="accent1">
+              <a:shade val="15000"/>
+            </a:schemeClr>
+          </a:lnRef>
+          <a:fillRef idx="1">
+            <a:schemeClr val="accent1"/>
+          </a:fillRef>
+          <a:effectRef idx="0">
+            <a:schemeClr val="accent1"/>
+          </a:effectRef>
+          <a:fontRef idx="minor">
+            <a:schemeClr val="lt1"/>
+          </a:fontRef>
+        </p:style>
+        <p:txBody>
+          <a:bodyPr rtlCol="0" anchor="ctr"/>
+          <a:lstStyle/>
+          <a:p>
+            <a:pPr algn="ctr"/>
+            <a:r>
+              <a:rPr lang="en-GB" dirty="0"/>
+              <a:t>Gmail</a:t>
+            </a:r>
+          </a:p>
+          <a:p>
+            <a:pPr algn="ctr"/>
+            <a:r>
+              <a:rPr lang="en-GB" sz="800" dirty="0"/>
+              <a:t>Non-volatile - ROM</a:t>
+            </a:r>
+          </a:p>
+        </p:txBody>
+      </p:sp>
+      <p:cxnSp>
+        <p:nvCxnSpPr>
+          <p:cNvPr id="15" name="Straight Arrow Connector 14">
+            <a:extLst>
+              <a:ext uri="{FF2B5EF4-FFF2-40B4-BE49-F238E27FC236}">
+                <a16:creationId xmlns:a16="http://schemas.microsoft.com/office/drawing/2014/main" id="{C14E428B-17BB-DDBB-CD33-76D11CE380E2}"/>
+              </a:ext>
+            </a:extLst>
+          </p:cNvPr>
+          <p:cNvCxnSpPr>
+            <a:stCxn id="6" idx="3"/>
+            <a:endCxn id="4" idx="1"/>
+          </p:cNvCxnSpPr>
+          <p:nvPr/>
+        </p:nvCxnSpPr>
+        <p:spPr>
+          <a:xfrm>
+            <a:off x="6832092" y="4938950"/>
+            <a:ext cx="1143291" cy="52890"/>
+          </a:xfrm>
+          <a:prstGeom prst="straightConnector1">
+            <a:avLst/>
+          </a:prstGeom>
+          <a:ln>
+            <a:tailEnd type="triangle"/>
+          </a:ln>
+        </p:spPr>
+        <p:style>
+          <a:lnRef idx="2">
+            <a:schemeClr val="accent1"/>
+          </a:lnRef>
+          <a:fillRef idx="0">
+            <a:schemeClr val="accent1"/>
+          </a:fillRef>
+          <a:effectRef idx="1">
+            <a:schemeClr val="accent1"/>
+          </a:effectRef>
+          <a:fontRef idx="minor">
+            <a:schemeClr val="tx1"/>
+          </a:fontRef>
+        </p:style>
+      </p:cxnSp>
+      <p:sp>
+        <p:nvSpPr>
+          <p:cNvPr id="22" name="Rectangle 21">
+            <a:extLst>
+              <a:ext uri="{FF2B5EF4-FFF2-40B4-BE49-F238E27FC236}">
+                <a16:creationId xmlns:a16="http://schemas.microsoft.com/office/drawing/2014/main" id="{D44FD395-5718-F60E-730C-F4C5C8E80A77}"/>
+              </a:ext>
+            </a:extLst>
+          </p:cNvPr>
+          <p:cNvSpPr/>
+          <p:nvPr/>
+        </p:nvSpPr>
+        <p:spPr>
+          <a:xfrm>
+            <a:off x="6232396" y="3023878"/>
+            <a:ext cx="1783080" cy="793148"/>
+          </a:xfrm>
+          <a:prstGeom prst="rect">
+            <a:avLst/>
+          </a:prstGeom>
+        </p:spPr>
+        <p:style>
+          <a:lnRef idx="2">
+            <a:schemeClr val="accent1">
+              <a:shade val="15000"/>
+            </a:schemeClr>
+          </a:lnRef>
+          <a:fillRef idx="1">
+            <a:schemeClr val="accent1"/>
+          </a:fillRef>
+          <a:effectRef idx="0">
+            <a:schemeClr val="accent1"/>
+          </a:effectRef>
+          <a:fontRef idx="minor">
+            <a:schemeClr val="lt1"/>
+          </a:fontRef>
+        </p:style>
+        <p:txBody>
+          <a:bodyPr rtlCol="0" anchor="ctr"/>
+          <a:lstStyle/>
+          <a:p>
+            <a:pPr algn="ctr"/>
+            <a:r>
+              <a:rPr lang="en-GB" dirty="0"/>
+              <a:t>Popup.js</a:t>
+            </a:r>
+          </a:p>
+        </p:txBody>
+      </p:sp>
+      <p:cxnSp>
+        <p:nvCxnSpPr>
+          <p:cNvPr id="27" name="Straight Arrow Connector 26">
+            <a:extLst>
+              <a:ext uri="{FF2B5EF4-FFF2-40B4-BE49-F238E27FC236}">
+                <a16:creationId xmlns:a16="http://schemas.microsoft.com/office/drawing/2014/main" id="{78AF251B-6CD4-50C4-8A2A-41F309700AEA}"/>
+              </a:ext>
+            </a:extLst>
+          </p:cNvPr>
+          <p:cNvCxnSpPr>
+            <a:stCxn id="22" idx="3"/>
+            <a:endCxn id="6" idx="0"/>
+          </p:cNvCxnSpPr>
+          <p:nvPr/>
+        </p:nvCxnSpPr>
+        <p:spPr>
+          <a:xfrm flipH="1">
+            <a:off x="5821680" y="3420452"/>
+            <a:ext cx="2193796" cy="1097874"/>
+          </a:xfrm>
+          <a:prstGeom prst="straightConnector1">
+            <a:avLst/>
+          </a:prstGeom>
+          <a:ln>
+            <a:tailEnd type="triangle"/>
+          </a:ln>
+        </p:spPr>
+        <p:style>
+          <a:lnRef idx="2">
+            <a:schemeClr val="accent1"/>
+          </a:lnRef>
+          <a:fillRef idx="0">
+            <a:schemeClr val="accent1"/>
+          </a:fillRef>
+          <a:effectRef idx="1">
+            <a:schemeClr val="accent1"/>
+          </a:effectRef>
+          <a:fontRef idx="minor">
+            <a:schemeClr val="tx1"/>
+          </a:fontRef>
+        </p:style>
+      </p:cxnSp>
+      <p:cxnSp>
+        <p:nvCxnSpPr>
+          <p:cNvPr id="29" name="Straight Arrow Connector 28">
+            <a:extLst>
+              <a:ext uri="{FF2B5EF4-FFF2-40B4-BE49-F238E27FC236}">
+                <a16:creationId xmlns:a16="http://schemas.microsoft.com/office/drawing/2014/main" id="{14938A56-CBC9-2837-2F13-CEC64545B96E}"/>
+              </a:ext>
+            </a:extLst>
+          </p:cNvPr>
+          <p:cNvCxnSpPr>
+            <a:stCxn id="11" idx="3"/>
+            <a:endCxn id="6" idx="1"/>
+          </p:cNvCxnSpPr>
+          <p:nvPr/>
+        </p:nvCxnSpPr>
+        <p:spPr>
+          <a:xfrm flipV="1">
+            <a:off x="3758182" y="4938950"/>
+            <a:ext cx="1053086" cy="19478"/>
+          </a:xfrm>
+          <a:prstGeom prst="straightConnector1">
+            <a:avLst/>
+          </a:prstGeom>
+          <a:ln>
+            <a:headEnd type="triangle"/>
+            <a:tailEnd type="triangle"/>
+          </a:ln>
+        </p:spPr>
+        <p:style>
+          <a:lnRef idx="2">
+            <a:schemeClr val="accent1"/>
+          </a:lnRef>
+          <a:fillRef idx="0">
+            <a:schemeClr val="accent1"/>
+          </a:fillRef>
+          <a:effectRef idx="1">
+            <a:schemeClr val="accent1"/>
+          </a:effectRef>
+          <a:fontRef idx="minor">
+            <a:schemeClr val="tx1"/>
+          </a:fontRef>
+        </p:style>
+      </p:cxnSp>
+      <p:sp>
+        <p:nvSpPr>
+          <p:cNvPr id="31" name="Rectangle: Rounded Corners 30">
+            <a:extLst>
+              <a:ext uri="{FF2B5EF4-FFF2-40B4-BE49-F238E27FC236}">
+                <a16:creationId xmlns:a16="http://schemas.microsoft.com/office/drawing/2014/main" id="{3A2472B9-7B75-6DB6-4287-42861BBF7A3F}"/>
+              </a:ext>
+            </a:extLst>
+          </p:cNvPr>
+          <p:cNvSpPr/>
+          <p:nvPr/>
+        </p:nvSpPr>
+        <p:spPr>
+          <a:xfrm>
+            <a:off x="1152140" y="2412430"/>
+            <a:ext cx="1664208" cy="722376"/>
+          </a:xfrm>
+          <a:prstGeom prst="roundRect">
+            <a:avLst/>
+          </a:prstGeom>
+        </p:spPr>
+        <p:style>
+          <a:lnRef idx="2">
+            <a:schemeClr val="accent2">
+              <a:shade val="15000"/>
+            </a:schemeClr>
+          </a:lnRef>
+          <a:fillRef idx="1">
+            <a:schemeClr val="accent2"/>
+          </a:fillRef>
+          <a:effectRef idx="0">
+            <a:schemeClr val="accent2"/>
+          </a:effectRef>
+          <a:fontRef idx="minor">
+            <a:schemeClr val="lt1"/>
+          </a:fontRef>
+        </p:style>
+        <p:txBody>
+          <a:bodyPr rtlCol="0" anchor="ctr"/>
+          <a:lstStyle/>
+          <a:p>
+            <a:pPr algn="ctr"/>
+            <a:r>
+              <a:rPr lang="en-GB" dirty="0"/>
+              <a:t>Highlight.js</a:t>
+            </a:r>
+          </a:p>
+        </p:txBody>
+      </p:sp>
+      <p:cxnSp>
+        <p:nvCxnSpPr>
+          <p:cNvPr id="37" name="Straight Arrow Connector 36">
+            <a:extLst>
+              <a:ext uri="{FF2B5EF4-FFF2-40B4-BE49-F238E27FC236}">
+                <a16:creationId xmlns:a16="http://schemas.microsoft.com/office/drawing/2014/main" id="{9F5F16A9-42EC-3EA2-7FCD-0FF95BE1E678}"/>
+              </a:ext>
+            </a:extLst>
+          </p:cNvPr>
+          <p:cNvCxnSpPr>
+            <a:stCxn id="5" idx="1"/>
+            <a:endCxn id="31" idx="3"/>
+          </p:cNvCxnSpPr>
+          <p:nvPr/>
+        </p:nvCxnSpPr>
+        <p:spPr>
+          <a:xfrm flipH="1">
+            <a:off x="2816348" y="2499864"/>
+            <a:ext cx="1569015" cy="273754"/>
+          </a:xfrm>
+          <a:prstGeom prst="straightConnector1">
+            <a:avLst/>
+          </a:prstGeom>
+          <a:ln>
+            <a:tailEnd type="triangle"/>
+          </a:ln>
+        </p:spPr>
+        <p:style>
+          <a:lnRef idx="2">
+            <a:schemeClr val="accent1"/>
+          </a:lnRef>
+          <a:fillRef idx="0">
+            <a:schemeClr val="accent1"/>
+          </a:fillRef>
+          <a:effectRef idx="1">
+            <a:schemeClr val="accent1"/>
+          </a:effectRef>
+          <a:fontRef idx="minor">
+            <a:schemeClr val="tx1"/>
+          </a:fontRef>
+        </p:style>
+      </p:cxnSp>
+      <p:cxnSp>
+        <p:nvCxnSpPr>
+          <p:cNvPr id="40" name="Straight Arrow Connector 39">
+            <a:extLst>
+              <a:ext uri="{FF2B5EF4-FFF2-40B4-BE49-F238E27FC236}">
+                <a16:creationId xmlns:a16="http://schemas.microsoft.com/office/drawing/2014/main" id="{FF042480-8E38-DDE8-1DF1-DE1CF2691005}"/>
+              </a:ext>
+            </a:extLst>
+          </p:cNvPr>
+          <p:cNvCxnSpPr>
+            <a:stCxn id="31" idx="2"/>
+            <a:endCxn id="11" idx="0"/>
+          </p:cNvCxnSpPr>
+          <p:nvPr/>
+        </p:nvCxnSpPr>
+        <p:spPr>
+          <a:xfrm>
+            <a:off x="1984244" y="3134806"/>
+            <a:ext cx="896114" cy="1404188"/>
+          </a:xfrm>
+          <a:prstGeom prst="straightConnector1">
+            <a:avLst/>
+          </a:prstGeom>
+          <a:ln>
+            <a:tailEnd type="triangle"/>
+          </a:ln>
+        </p:spPr>
+        <p:style>
+          <a:lnRef idx="2">
+            <a:schemeClr val="accent1"/>
+          </a:lnRef>
+          <a:fillRef idx="0">
+            <a:schemeClr val="accent1"/>
+          </a:fillRef>
+          <a:effectRef idx="1">
+            <a:schemeClr val="accent1"/>
+          </a:effectRef>
+          <a:fontRef idx="minor">
+            <a:schemeClr val="tx1"/>
+          </a:fontRef>
+        </p:style>
+      </p:cxnSp>
+      <p:cxnSp>
+        <p:nvCxnSpPr>
+          <p:cNvPr id="13" name="Straight Arrow Connector 12">
+            <a:extLst>
+              <a:ext uri="{FF2B5EF4-FFF2-40B4-BE49-F238E27FC236}">
+                <a16:creationId xmlns:a16="http://schemas.microsoft.com/office/drawing/2014/main" id="{0CE8B76D-4002-B053-0A59-897C6BE761F2}"/>
+              </a:ext>
+            </a:extLst>
+          </p:cNvPr>
+          <p:cNvCxnSpPr>
+            <a:stCxn id="5" idx="3"/>
+            <a:endCxn id="22" idx="0"/>
+          </p:cNvCxnSpPr>
+          <p:nvPr/>
+        </p:nvCxnSpPr>
+        <p:spPr>
+          <a:xfrm>
+            <a:off x="5912411" y="2499864"/>
+            <a:ext cx="1211525" cy="524014"/>
+          </a:xfrm>
+          <a:prstGeom prst="straightConnector1">
+            <a:avLst/>
+          </a:prstGeom>
+          <a:ln>
+            <a:tailEnd type="triangle"/>
+          </a:ln>
+        </p:spPr>
+        <p:style>
+          <a:lnRef idx="2">
+            <a:schemeClr val="accent1"/>
+          </a:lnRef>
+          <a:fillRef idx="0">
+            <a:schemeClr val="accent1"/>
+          </a:fillRef>
+          <a:effectRef idx="1">
+            <a:schemeClr val="accent1"/>
+          </a:effectRef>
+          <a:fontRef idx="minor">
+            <a:schemeClr val="tx1"/>
+          </a:fontRef>
+        </p:style>
+      </p:cxnSp>
+      <p:sp>
+        <p:nvSpPr>
+          <p:cNvPr id="14" name="Rectangle 13">
+            <a:extLst>
+              <a:ext uri="{FF2B5EF4-FFF2-40B4-BE49-F238E27FC236}">
+                <a16:creationId xmlns:a16="http://schemas.microsoft.com/office/drawing/2014/main" id="{E0477EB9-845A-4054-FD16-B7BA6E8523BA}"/>
+              </a:ext>
+            </a:extLst>
+          </p:cNvPr>
+          <p:cNvSpPr/>
+          <p:nvPr/>
+        </p:nvSpPr>
+        <p:spPr>
+          <a:xfrm>
+            <a:off x="2140510" y="356616"/>
+            <a:ext cx="1617673" cy="722376"/>
+          </a:xfrm>
+          <a:prstGeom prst="rect">
+            <a:avLst/>
+          </a:prstGeom>
+        </p:spPr>
+        <p:style>
+          <a:lnRef idx="2">
+            <a:schemeClr val="accent1">
+              <a:shade val="15000"/>
+            </a:schemeClr>
+          </a:lnRef>
+          <a:fillRef idx="1">
+            <a:schemeClr val="accent1"/>
+          </a:fillRef>
+          <a:effectRef idx="0">
+            <a:schemeClr val="accent1"/>
+          </a:effectRef>
+          <a:fontRef idx="minor">
+            <a:schemeClr val="lt1"/>
+          </a:fontRef>
+        </p:style>
+        <p:txBody>
+          <a:bodyPr rtlCol="0" anchor="ctr"/>
+          <a:lstStyle/>
+          <a:p>
+            <a:pPr algn="ctr"/>
+            <a:r>
+              <a:rPr lang="en-GB" dirty="0" err="1"/>
+              <a:t>BAD_WORDS.json</a:t>
+            </a:r>
+            <a:endParaRPr lang="en-GB" dirty="0"/>
+          </a:p>
+        </p:txBody>
+      </p:sp>
+      <p:cxnSp>
+        <p:nvCxnSpPr>
+          <p:cNvPr id="17" name="Straight Arrow Connector 16">
+            <a:extLst>
+              <a:ext uri="{FF2B5EF4-FFF2-40B4-BE49-F238E27FC236}">
+                <a16:creationId xmlns:a16="http://schemas.microsoft.com/office/drawing/2014/main" id="{B5C0BD66-55D3-46C3-7F19-BD2234CB2BB1}"/>
+              </a:ext>
+            </a:extLst>
+          </p:cNvPr>
+          <p:cNvCxnSpPr>
+            <a:stCxn id="4" idx="0"/>
+            <a:endCxn id="9" idx="2"/>
+          </p:cNvCxnSpPr>
+          <p:nvPr/>
+        </p:nvCxnSpPr>
+        <p:spPr>
+          <a:xfrm flipV="1">
+            <a:off x="8898927" y="1760641"/>
+            <a:ext cx="1296633" cy="2773999"/>
+          </a:xfrm>
+          <a:prstGeom prst="straightConnector1">
+            <a:avLst/>
+          </a:prstGeom>
+          <a:ln>
+            <a:tailEnd type="triangle"/>
+          </a:ln>
+        </p:spPr>
+        <p:style>
+          <a:lnRef idx="2">
+            <a:schemeClr val="accent1"/>
+          </a:lnRef>
+          <a:fillRef idx="0">
+            <a:schemeClr val="accent1"/>
+          </a:fillRef>
+          <a:effectRef idx="1">
+            <a:schemeClr val="accent1"/>
+          </a:effectRef>
+          <a:fontRef idx="minor">
+            <a:schemeClr val="tx1"/>
+          </a:fontRef>
+        </p:style>
+      </p:cxnSp>
+      <p:cxnSp>
+        <p:nvCxnSpPr>
+          <p:cNvPr id="19" name="Straight Arrow Connector 18">
+            <a:extLst>
+              <a:ext uri="{FF2B5EF4-FFF2-40B4-BE49-F238E27FC236}">
+                <a16:creationId xmlns:a16="http://schemas.microsoft.com/office/drawing/2014/main" id="{74E70D37-C55F-3F9B-C3B6-16527AA7C08C}"/>
+              </a:ext>
+            </a:extLst>
+          </p:cNvPr>
+          <p:cNvCxnSpPr>
+            <a:stCxn id="9" idx="1"/>
+            <a:endCxn id="14" idx="3"/>
+          </p:cNvCxnSpPr>
+          <p:nvPr/>
+        </p:nvCxnSpPr>
+        <p:spPr>
+          <a:xfrm flipH="1" flipV="1">
+            <a:off x="3758183" y="717804"/>
+            <a:ext cx="4864609" cy="217381"/>
+          </a:xfrm>
+          <a:prstGeom prst="straightConnector1">
+            <a:avLst/>
+          </a:prstGeom>
+          <a:ln>
+            <a:tailEnd type="triangle"/>
+          </a:ln>
+        </p:spPr>
+        <p:style>
+          <a:lnRef idx="2">
+            <a:schemeClr val="accent1"/>
+          </a:lnRef>
+          <a:fillRef idx="0">
+            <a:schemeClr val="accent1"/>
+          </a:fillRef>
+          <a:effectRef idx="1">
+            <a:schemeClr val="accent1"/>
+          </a:effectRef>
+          <a:fontRef idx="minor">
+            <a:schemeClr val="tx1"/>
+          </a:fontRef>
+        </p:style>
+      </p:cxnSp>
+      <p:cxnSp>
+        <p:nvCxnSpPr>
+          <p:cNvPr id="21" name="Straight Arrow Connector 20">
+            <a:extLst>
+              <a:ext uri="{FF2B5EF4-FFF2-40B4-BE49-F238E27FC236}">
+                <a16:creationId xmlns:a16="http://schemas.microsoft.com/office/drawing/2014/main" id="{24309CDE-72AC-782A-23D6-768D93B49BAD}"/>
+              </a:ext>
+            </a:extLst>
+          </p:cNvPr>
+          <p:cNvCxnSpPr>
+            <a:stCxn id="14" idx="2"/>
+            <a:endCxn id="31" idx="0"/>
+          </p:cNvCxnSpPr>
+          <p:nvPr/>
+        </p:nvCxnSpPr>
+        <p:spPr>
+          <a:xfrm flipH="1">
+            <a:off x="1984244" y="1078992"/>
+            <a:ext cx="965103" cy="1333438"/>
+          </a:xfrm>
+          <a:prstGeom prst="straightConnector1">
+            <a:avLst/>
+          </a:prstGeom>
+          <a:ln>
+            <a:tailEnd type="triangle"/>
+          </a:ln>
+        </p:spPr>
+        <p:style>
+          <a:lnRef idx="2">
+            <a:schemeClr val="accent1"/>
+          </a:lnRef>
+          <a:fillRef idx="0">
+            <a:schemeClr val="accent1"/>
+          </a:fillRef>
+          <a:effectRef idx="1">
+            <a:schemeClr val="accent1"/>
+          </a:effectRef>
+          <a:fontRef idx="minor">
+            <a:schemeClr val="tx1"/>
+          </a:fontRef>
+        </p:style>
+      </p:cxnSp>
+      <p:sp>
+        <p:nvSpPr>
+          <p:cNvPr id="24" name="TextBox 23">
+            <a:extLst>
+              <a:ext uri="{FF2B5EF4-FFF2-40B4-BE49-F238E27FC236}">
+                <a16:creationId xmlns:a16="http://schemas.microsoft.com/office/drawing/2014/main" id="{1671599A-70EE-70BA-4F1C-DF269A5E3DA6}"/>
+              </a:ext>
+            </a:extLst>
+          </p:cNvPr>
+          <p:cNvSpPr txBox="1"/>
+          <p:nvPr/>
+        </p:nvSpPr>
+        <p:spPr>
+          <a:xfrm>
+            <a:off x="9516461" y="2916936"/>
+            <a:ext cx="1645920" cy="523220"/>
+          </a:xfrm>
+          <a:prstGeom prst="rect">
+            <a:avLst/>
+          </a:prstGeom>
+          <a:noFill/>
+        </p:spPr>
+        <p:txBody>
+          <a:bodyPr wrap="square" rtlCol="0">
+            <a:spAutoFit/>
+          </a:bodyPr>
+          <a:lstStyle/>
+          <a:p>
+            <a:r>
+              <a:rPr lang="en-GB" sz="1400" dirty="0"/>
+              <a:t>Take to process data</a:t>
+            </a:r>
+          </a:p>
+        </p:txBody>
+      </p:sp>
+      <p:sp>
+        <p:nvSpPr>
+          <p:cNvPr id="25" name="TextBox 24">
+            <a:extLst>
+              <a:ext uri="{FF2B5EF4-FFF2-40B4-BE49-F238E27FC236}">
+                <a16:creationId xmlns:a16="http://schemas.microsoft.com/office/drawing/2014/main" id="{898B182A-7E32-9FFD-8074-52D9F5294687}"/>
+              </a:ext>
+            </a:extLst>
+          </p:cNvPr>
+          <p:cNvSpPr txBox="1"/>
+          <p:nvPr/>
+        </p:nvSpPr>
+        <p:spPr>
+          <a:xfrm>
+            <a:off x="5148887" y="475499"/>
+            <a:ext cx="1617673" cy="276999"/>
+          </a:xfrm>
+          <a:prstGeom prst="rect">
+            <a:avLst/>
+          </a:prstGeom>
+          <a:noFill/>
+        </p:spPr>
+        <p:txBody>
+          <a:bodyPr wrap="square" rtlCol="0">
+            <a:spAutoFit/>
+          </a:bodyPr>
+          <a:lstStyle/>
+          <a:p>
+            <a:r>
+              <a:rPr lang="en-GB" sz="1200" i="1" dirty="0"/>
+              <a:t>Identified bad words </a:t>
+            </a:r>
+          </a:p>
+        </p:txBody>
+      </p:sp>
+      <p:sp>
+        <p:nvSpPr>
+          <p:cNvPr id="26" name="TextBox 25">
+            <a:extLst>
+              <a:ext uri="{FF2B5EF4-FFF2-40B4-BE49-F238E27FC236}">
+                <a16:creationId xmlns:a16="http://schemas.microsoft.com/office/drawing/2014/main" id="{98B33B6B-F3F5-3E0E-15B5-59F4F2771A86}"/>
+              </a:ext>
+            </a:extLst>
+          </p:cNvPr>
+          <p:cNvSpPr txBox="1"/>
+          <p:nvPr/>
+        </p:nvSpPr>
+        <p:spPr>
+          <a:xfrm>
+            <a:off x="1536187" y="1384984"/>
+            <a:ext cx="896114" cy="307777"/>
+          </a:xfrm>
+          <a:prstGeom prst="rect">
+            <a:avLst/>
+          </a:prstGeom>
+          <a:noFill/>
+        </p:spPr>
+        <p:txBody>
+          <a:bodyPr wrap="square" rtlCol="0">
+            <a:spAutoFit/>
+          </a:bodyPr>
+          <a:lstStyle/>
+          <a:p>
+            <a:r>
+              <a:rPr lang="en-GB" sz="1400" dirty="0"/>
+              <a:t>Feeds UI</a:t>
+            </a:r>
+            <a:endParaRPr lang="en-GB" dirty="0"/>
+          </a:p>
+        </p:txBody>
+      </p:sp>
+      <p:sp>
+        <p:nvSpPr>
+          <p:cNvPr id="28" name="TextBox 27">
+            <a:extLst>
+              <a:ext uri="{FF2B5EF4-FFF2-40B4-BE49-F238E27FC236}">
+                <a16:creationId xmlns:a16="http://schemas.microsoft.com/office/drawing/2014/main" id="{63E34D93-38B9-4FA8-6807-63F46698119B}"/>
+              </a:ext>
+            </a:extLst>
+          </p:cNvPr>
+          <p:cNvSpPr txBox="1"/>
+          <p:nvPr/>
+        </p:nvSpPr>
+        <p:spPr>
+          <a:xfrm>
+            <a:off x="2403725" y="3643720"/>
+            <a:ext cx="1161291" cy="261610"/>
+          </a:xfrm>
+          <a:prstGeom prst="rect">
+            <a:avLst/>
+          </a:prstGeom>
+          <a:noFill/>
+        </p:spPr>
+        <p:txBody>
+          <a:bodyPr wrap="square" rtlCol="0">
+            <a:spAutoFit/>
+          </a:bodyPr>
+          <a:lstStyle/>
+          <a:p>
+            <a:r>
+              <a:rPr lang="en-GB" sz="1100" dirty="0"/>
+              <a:t>Overlays UI</a:t>
+            </a:r>
+          </a:p>
+        </p:txBody>
+      </p:sp>
+      <p:sp>
+        <p:nvSpPr>
+          <p:cNvPr id="30" name="TextBox 29">
+            <a:extLst>
+              <a:ext uri="{FF2B5EF4-FFF2-40B4-BE49-F238E27FC236}">
+                <a16:creationId xmlns:a16="http://schemas.microsoft.com/office/drawing/2014/main" id="{CB6B2ED8-87A5-EDD9-E837-0615D23D3B64}"/>
+              </a:ext>
+            </a:extLst>
+          </p:cNvPr>
+          <p:cNvSpPr txBox="1"/>
+          <p:nvPr/>
+        </p:nvSpPr>
+        <p:spPr>
+          <a:xfrm>
+            <a:off x="3836668" y="4538994"/>
+            <a:ext cx="896114" cy="369332"/>
+          </a:xfrm>
+          <a:prstGeom prst="rect">
+            <a:avLst/>
+          </a:prstGeom>
+          <a:noFill/>
+        </p:spPr>
+        <p:txBody>
+          <a:bodyPr wrap="square" rtlCol="0">
+            <a:spAutoFit/>
+          </a:bodyPr>
+          <a:lstStyle/>
+          <a:p>
+            <a:r>
+              <a:rPr lang="en-GB" dirty="0"/>
+              <a:t>scrape</a:t>
+            </a:r>
+          </a:p>
+        </p:txBody>
+      </p:sp>
+      <p:sp>
+        <p:nvSpPr>
+          <p:cNvPr id="34" name="TextBox 33">
+            <a:extLst>
+              <a:ext uri="{FF2B5EF4-FFF2-40B4-BE49-F238E27FC236}">
+                <a16:creationId xmlns:a16="http://schemas.microsoft.com/office/drawing/2014/main" id="{B2394173-CDDE-5354-1E46-396B441152B8}"/>
+              </a:ext>
+            </a:extLst>
+          </p:cNvPr>
+          <p:cNvSpPr txBox="1"/>
+          <p:nvPr/>
+        </p:nvSpPr>
+        <p:spPr>
+          <a:xfrm>
+            <a:off x="6986016" y="4617720"/>
+            <a:ext cx="1280160" cy="923330"/>
+          </a:xfrm>
+          <a:prstGeom prst="rect">
+            <a:avLst/>
+          </a:prstGeom>
+          <a:noFill/>
+        </p:spPr>
+        <p:txBody>
+          <a:bodyPr wrap="square" rtlCol="0">
+            <a:spAutoFit/>
+          </a:bodyPr>
+          <a:lstStyle/>
+          <a:p>
+            <a:r>
+              <a:rPr lang="en-GB" dirty="0"/>
+              <a:t>Store Scraped Data</a:t>
+            </a:r>
+          </a:p>
+        </p:txBody>
+      </p:sp>
+      <p:cxnSp>
+        <p:nvCxnSpPr>
+          <p:cNvPr id="36" name="Straight Arrow Connector 35">
+            <a:extLst>
+              <a:ext uri="{FF2B5EF4-FFF2-40B4-BE49-F238E27FC236}">
+                <a16:creationId xmlns:a16="http://schemas.microsoft.com/office/drawing/2014/main" id="{AEEAC708-99F9-5660-1C31-F3D6F8E05E1D}"/>
+              </a:ext>
+            </a:extLst>
+          </p:cNvPr>
+          <p:cNvCxnSpPr>
+            <a:cxnSpLocks/>
+            <a:stCxn id="39" idx="0"/>
+            <a:endCxn id="14" idx="3"/>
+          </p:cNvCxnSpPr>
+          <p:nvPr/>
+        </p:nvCxnSpPr>
+        <p:spPr>
+          <a:xfrm flipH="1" flipV="1">
+            <a:off x="3758183" y="717804"/>
+            <a:ext cx="711524" cy="322229"/>
+          </a:xfrm>
+          <a:prstGeom prst="straightConnector1">
+            <a:avLst/>
+          </a:prstGeom>
+          <a:ln>
+            <a:tailEnd type="triangle"/>
+          </a:ln>
+        </p:spPr>
+        <p:style>
+          <a:lnRef idx="2">
+            <a:schemeClr val="accent1"/>
+          </a:lnRef>
+          <a:fillRef idx="0">
+            <a:schemeClr val="accent1"/>
+          </a:fillRef>
+          <a:effectRef idx="1">
+            <a:schemeClr val="accent1"/>
+          </a:effectRef>
+          <a:fontRef idx="minor">
+            <a:schemeClr val="tx1"/>
+          </a:fontRef>
+        </p:style>
+      </p:cxnSp>
+      <p:sp>
+        <p:nvSpPr>
+          <p:cNvPr id="39" name="Rectangle 38">
+            <a:extLst>
+              <a:ext uri="{FF2B5EF4-FFF2-40B4-BE49-F238E27FC236}">
+                <a16:creationId xmlns:a16="http://schemas.microsoft.com/office/drawing/2014/main" id="{A50DE6B0-B95B-B1C1-4CC2-7CE725FD943D}"/>
+              </a:ext>
+            </a:extLst>
+          </p:cNvPr>
+          <p:cNvSpPr/>
+          <p:nvPr/>
+        </p:nvSpPr>
+        <p:spPr>
+          <a:xfrm>
+            <a:off x="3811525" y="1040033"/>
+            <a:ext cx="1316363" cy="793148"/>
+          </a:xfrm>
+          <a:prstGeom prst="rect">
+            <a:avLst/>
+          </a:prstGeom>
+        </p:spPr>
+        <p:style>
+          <a:lnRef idx="2">
+            <a:schemeClr val="accent1">
+              <a:shade val="15000"/>
+            </a:schemeClr>
+          </a:lnRef>
+          <a:fillRef idx="1">
+            <a:schemeClr val="accent1"/>
+          </a:fillRef>
+          <a:effectRef idx="0">
+            <a:schemeClr val="accent1"/>
+          </a:effectRef>
+          <a:fontRef idx="minor">
+            <a:schemeClr val="lt1"/>
+          </a:fontRef>
+        </p:style>
+        <p:txBody>
+          <a:bodyPr rtlCol="0" anchor="ctr"/>
+          <a:lstStyle/>
+          <a:p>
+            <a:pPr algn="ctr"/>
+            <a:r>
+              <a:rPr lang="en-GB" dirty="0"/>
+              <a:t>May need to be </a:t>
+            </a:r>
+            <a:r>
+              <a:rPr lang="en-GB" dirty="0" err="1"/>
+              <a:t>api</a:t>
+            </a:r>
+            <a:r>
+              <a:rPr lang="en-GB" dirty="0"/>
+              <a:t> serviced</a:t>
+            </a:r>
+          </a:p>
+        </p:txBody>
+      </p:sp>
+      <p:sp>
+        <p:nvSpPr>
+          <p:cNvPr id="49" name="Rectangle 48">
+            <a:extLst>
+              <a:ext uri="{FF2B5EF4-FFF2-40B4-BE49-F238E27FC236}">
+                <a16:creationId xmlns:a16="http://schemas.microsoft.com/office/drawing/2014/main" id="{17DE46C2-BFF2-82D0-E82E-E498247C895B}"/>
+              </a:ext>
+            </a:extLst>
+          </p:cNvPr>
+          <p:cNvSpPr/>
+          <p:nvPr/>
+        </p:nvSpPr>
+        <p:spPr>
+          <a:xfrm>
+            <a:off x="164592" y="5614416"/>
+            <a:ext cx="3593590" cy="1167633"/>
+          </a:xfrm>
+          <a:prstGeom prst="rect">
+            <a:avLst/>
+          </a:prstGeom>
+        </p:spPr>
+        <p:style>
+          <a:lnRef idx="2">
+            <a:schemeClr val="accent1">
+              <a:shade val="15000"/>
+            </a:schemeClr>
+          </a:lnRef>
+          <a:fillRef idx="1">
+            <a:schemeClr val="accent1"/>
+          </a:fillRef>
+          <a:effectRef idx="0">
+            <a:schemeClr val="accent1"/>
+          </a:effectRef>
+          <a:fontRef idx="minor">
+            <a:schemeClr val="lt1"/>
+          </a:fontRef>
+        </p:style>
+        <p:txBody>
+          <a:bodyPr rtlCol="0" anchor="ctr"/>
+          <a:lstStyle/>
+          <a:p>
+            <a:pPr algn="ctr"/>
+            <a:r>
+              <a:rPr lang="en-GB" dirty="0"/>
+              <a:t>WORD OR URL</a:t>
+            </a:r>
+            <a:br>
+              <a:rPr lang="en-GB" dirty="0"/>
+            </a:br>
+            <a:r>
+              <a:rPr lang="en-GB" dirty="0"/>
+              <a:t>identification only</a:t>
+            </a:r>
+          </a:p>
+          <a:p>
+            <a:pPr algn="ctr"/>
+            <a:r>
+              <a:rPr lang="en-GB" sz="1100" dirty="0"/>
+              <a:t>Not yet language analysis</a:t>
+            </a:r>
+          </a:p>
+        </p:txBody>
+      </p:sp>
+    </p:spTree>
+    <p:extLst>
+      <p:ext uri="{BB962C8B-B14F-4D97-AF65-F5344CB8AC3E}">
+        <p14:creationId xmlns:p14="http://schemas.microsoft.com/office/powerpoint/2010/main" val="1146407584"/>
+      </p:ext>
+    </p:extLst>
+  </p:cSld>
+  <p:clrMapOvr>
+    <a:masterClrMapping/>
+  </p:clrMapOvr>
+</p:sld>
+</file>
+
+<file path=ppt/slides/slide3.xml><?xml version="1.0" encoding="utf-8"?>
+<p:sld xmlns:a="http://schemas.openxmlformats.org/drawingml/2006/main" xmlns:r="http://schemas.openxmlformats.org/officeDocument/2006/relationships" xmlns:p="http://schemas.openxmlformats.org/presentationml/2006/main">
+  <p:cSld>
+    <p:spTree>
+      <p:nvGrpSpPr>
+        <p:cNvPr id="1" name=""/>
+        <p:cNvGrpSpPr/>
+        <p:nvPr/>
+      </p:nvGrpSpPr>
+      <p:grpSpPr>
+        <a:xfrm>
+          <a:off x="0" y="0"/>
+          <a:ext cx="0" cy="0"/>
+          <a:chOff x="0" y="0"/>
+          <a:chExt cx="0" cy="0"/>
+        </a:xfrm>
+      </p:grpSpPr>
+    </p:spTree>
+    <p:extLst>
+      <p:ext uri="{BB962C8B-B14F-4D97-AF65-F5344CB8AC3E}">
+        <p14:creationId xmlns:p14="http://schemas.microsoft.com/office/powerpoint/2010/main" val="3827761004"/>
       </p:ext>
     </p:extLst>
   </p:cSld>

</xml_diff>

<commit_message>
It works kind off
It now highlights words in gmail!!!!
</commit_message>
<xml_diff>
--- a/COMP 3000/Project Docs/Process diagram.pptx
+++ b/COMP 3000/Project Docs/Process diagram.pptx
@@ -263,7 +263,7 @@
           <a:p>
             <a:fld id="{E239C3FF-4299-45FA-A552-BB98A650FEDD}" type="datetimeFigureOut">
               <a:rPr lang="en-GB" smtClean="0"/>
-              <a:t>18/11/2025</a:t>
+              <a:t>19/11/2025</a:t>
             </a:fld>
             <a:endParaRPr lang="en-GB"/>
           </a:p>
@@ -463,7 +463,7 @@
           <a:p>
             <a:fld id="{E239C3FF-4299-45FA-A552-BB98A650FEDD}" type="datetimeFigureOut">
               <a:rPr lang="en-GB" smtClean="0"/>
-              <a:t>18/11/2025</a:t>
+              <a:t>19/11/2025</a:t>
             </a:fld>
             <a:endParaRPr lang="en-GB"/>
           </a:p>
@@ -673,7 +673,7 @@
           <a:p>
             <a:fld id="{E239C3FF-4299-45FA-A552-BB98A650FEDD}" type="datetimeFigureOut">
               <a:rPr lang="en-GB" smtClean="0"/>
-              <a:t>18/11/2025</a:t>
+              <a:t>19/11/2025</a:t>
             </a:fld>
             <a:endParaRPr lang="en-GB"/>
           </a:p>
@@ -873,7 +873,7 @@
           <a:p>
             <a:fld id="{E239C3FF-4299-45FA-A552-BB98A650FEDD}" type="datetimeFigureOut">
               <a:rPr lang="en-GB" smtClean="0"/>
-              <a:t>18/11/2025</a:t>
+              <a:t>19/11/2025</a:t>
             </a:fld>
             <a:endParaRPr lang="en-GB"/>
           </a:p>
@@ -1149,7 +1149,7 @@
           <a:p>
             <a:fld id="{E239C3FF-4299-45FA-A552-BB98A650FEDD}" type="datetimeFigureOut">
               <a:rPr lang="en-GB" smtClean="0"/>
-              <a:t>18/11/2025</a:t>
+              <a:t>19/11/2025</a:t>
             </a:fld>
             <a:endParaRPr lang="en-GB"/>
           </a:p>
@@ -1417,7 +1417,7 @@
           <a:p>
             <a:fld id="{E239C3FF-4299-45FA-A552-BB98A650FEDD}" type="datetimeFigureOut">
               <a:rPr lang="en-GB" smtClean="0"/>
-              <a:t>18/11/2025</a:t>
+              <a:t>19/11/2025</a:t>
             </a:fld>
             <a:endParaRPr lang="en-GB"/>
           </a:p>
@@ -1832,7 +1832,7 @@
           <a:p>
             <a:fld id="{E239C3FF-4299-45FA-A552-BB98A650FEDD}" type="datetimeFigureOut">
               <a:rPr lang="en-GB" smtClean="0"/>
-              <a:t>18/11/2025</a:t>
+              <a:t>19/11/2025</a:t>
             </a:fld>
             <a:endParaRPr lang="en-GB"/>
           </a:p>
@@ -1974,7 +1974,7 @@
           <a:p>
             <a:fld id="{E239C3FF-4299-45FA-A552-BB98A650FEDD}" type="datetimeFigureOut">
               <a:rPr lang="en-GB" smtClean="0"/>
-              <a:t>18/11/2025</a:t>
+              <a:t>19/11/2025</a:t>
             </a:fld>
             <a:endParaRPr lang="en-GB"/>
           </a:p>
@@ -2087,7 +2087,7 @@
           <a:p>
             <a:fld id="{E239C3FF-4299-45FA-A552-BB98A650FEDD}" type="datetimeFigureOut">
               <a:rPr lang="en-GB" smtClean="0"/>
-              <a:t>18/11/2025</a:t>
+              <a:t>19/11/2025</a:t>
             </a:fld>
             <a:endParaRPr lang="en-GB"/>
           </a:p>
@@ -2400,7 +2400,7 @@
           <a:p>
             <a:fld id="{E239C3FF-4299-45FA-A552-BB98A650FEDD}" type="datetimeFigureOut">
               <a:rPr lang="en-GB" smtClean="0"/>
-              <a:t>18/11/2025</a:t>
+              <a:t>19/11/2025</a:t>
             </a:fld>
             <a:endParaRPr lang="en-GB"/>
           </a:p>
@@ -2689,7 +2689,7 @@
           <a:p>
             <a:fld id="{E239C3FF-4299-45FA-A552-BB98A650FEDD}" type="datetimeFigureOut">
               <a:rPr lang="en-GB" smtClean="0"/>
-              <a:t>18/11/2025</a:t>
+              <a:t>19/11/2025</a:t>
             </a:fld>
             <a:endParaRPr lang="en-GB"/>
           </a:p>
@@ -2932,7 +2932,7 @@
           <a:p>
             <a:fld id="{E239C3FF-4299-45FA-A552-BB98A650FEDD}" type="datetimeFigureOut">
               <a:rPr lang="en-GB" smtClean="0"/>
-              <a:t>18/11/2025</a:t>
+              <a:t>19/11/2025</a:t>
             </a:fld>
             <a:endParaRPr lang="en-GB"/>
           </a:p>
@@ -5711,6 +5711,748 @@
           <a:chExt cx="0" cy="0"/>
         </a:xfrm>
       </p:grpSpPr>
+      <p:sp>
+        <p:nvSpPr>
+          <p:cNvPr id="2" name="Rectangle 1">
+            <a:extLst>
+              <a:ext uri="{FF2B5EF4-FFF2-40B4-BE49-F238E27FC236}">
+                <a16:creationId xmlns:a16="http://schemas.microsoft.com/office/drawing/2014/main" id="{D0669DD8-278B-3267-1C2A-0BDC5BC7B8A3}"/>
+              </a:ext>
+            </a:extLst>
+          </p:cNvPr>
+          <p:cNvSpPr/>
+          <p:nvPr/>
+        </p:nvSpPr>
+        <p:spPr>
+          <a:xfrm>
+            <a:off x="0" y="0"/>
+            <a:ext cx="2331720" cy="813816"/>
+          </a:xfrm>
+          <a:prstGeom prst="rect">
+            <a:avLst/>
+          </a:prstGeom>
+        </p:spPr>
+        <p:style>
+          <a:lnRef idx="2">
+            <a:schemeClr val="accent1">
+              <a:shade val="15000"/>
+            </a:schemeClr>
+          </a:lnRef>
+          <a:fillRef idx="1">
+            <a:schemeClr val="accent1"/>
+          </a:fillRef>
+          <a:effectRef idx="0">
+            <a:schemeClr val="accent1"/>
+          </a:effectRef>
+          <a:fontRef idx="minor">
+            <a:schemeClr val="lt1"/>
+          </a:fontRef>
+        </p:style>
+        <p:txBody>
+          <a:bodyPr rtlCol="0" anchor="ctr"/>
+          <a:lstStyle/>
+          <a:p>
+            <a:pPr algn="ctr"/>
+            <a:r>
+              <a:rPr lang="en-GB" dirty="0"/>
+              <a:t>How to get text</a:t>
+            </a:r>
+          </a:p>
+        </p:txBody>
+      </p:sp>
+      <p:sp>
+        <p:nvSpPr>
+          <p:cNvPr id="3" name="Rectangle 2">
+            <a:extLst>
+              <a:ext uri="{FF2B5EF4-FFF2-40B4-BE49-F238E27FC236}">
+                <a16:creationId xmlns:a16="http://schemas.microsoft.com/office/drawing/2014/main" id="{D89236E8-E33D-F1CB-08A8-B59753B3E58B}"/>
+              </a:ext>
+            </a:extLst>
+          </p:cNvPr>
+          <p:cNvSpPr/>
+          <p:nvPr/>
+        </p:nvSpPr>
+        <p:spPr>
+          <a:xfrm>
+            <a:off x="4096512" y="1271016"/>
+            <a:ext cx="2194560" cy="731520"/>
+          </a:xfrm>
+          <a:prstGeom prst="rect">
+            <a:avLst/>
+          </a:prstGeom>
+        </p:spPr>
+        <p:style>
+          <a:lnRef idx="2">
+            <a:schemeClr val="accent1">
+              <a:shade val="15000"/>
+            </a:schemeClr>
+          </a:lnRef>
+          <a:fillRef idx="1">
+            <a:schemeClr val="accent1"/>
+          </a:fillRef>
+          <a:effectRef idx="0">
+            <a:schemeClr val="accent1"/>
+          </a:effectRef>
+          <a:fontRef idx="minor">
+            <a:schemeClr val="lt1"/>
+          </a:fontRef>
+        </p:style>
+        <p:txBody>
+          <a:bodyPr rtlCol="0" anchor="ctr"/>
+          <a:lstStyle/>
+          <a:p>
+            <a:pPr algn="ctr"/>
+            <a:r>
+              <a:rPr lang="en-GB" dirty="0"/>
+              <a:t>Gmail email</a:t>
+            </a:r>
+          </a:p>
+        </p:txBody>
+      </p:sp>
+      <p:sp>
+        <p:nvSpPr>
+          <p:cNvPr id="4" name="Rectangle 3">
+            <a:extLst>
+              <a:ext uri="{FF2B5EF4-FFF2-40B4-BE49-F238E27FC236}">
+                <a16:creationId xmlns:a16="http://schemas.microsoft.com/office/drawing/2014/main" id="{256EA619-553C-FD0B-8FBF-8EDAD1CD1369}"/>
+              </a:ext>
+            </a:extLst>
+          </p:cNvPr>
+          <p:cNvSpPr/>
+          <p:nvPr/>
+        </p:nvSpPr>
+        <p:spPr>
+          <a:xfrm>
+            <a:off x="7900416" y="1271016"/>
+            <a:ext cx="2194560" cy="731520"/>
+          </a:xfrm>
+          <a:prstGeom prst="rect">
+            <a:avLst/>
+          </a:prstGeom>
+        </p:spPr>
+        <p:style>
+          <a:lnRef idx="2">
+            <a:schemeClr val="accent1">
+              <a:shade val="15000"/>
+            </a:schemeClr>
+          </a:lnRef>
+          <a:fillRef idx="1">
+            <a:schemeClr val="accent1"/>
+          </a:fillRef>
+          <a:effectRef idx="0">
+            <a:schemeClr val="accent1"/>
+          </a:effectRef>
+          <a:fontRef idx="minor">
+            <a:schemeClr val="lt1"/>
+          </a:fontRef>
+        </p:style>
+        <p:txBody>
+          <a:bodyPr rtlCol="0" anchor="ctr"/>
+          <a:lstStyle/>
+          <a:p>
+            <a:pPr algn="ctr"/>
+            <a:r>
+              <a:rPr lang="en-GB" dirty="0"/>
+              <a:t>&lt;Span&gt;</a:t>
+            </a:r>
+          </a:p>
+        </p:txBody>
+      </p:sp>
+      <p:cxnSp>
+        <p:nvCxnSpPr>
+          <p:cNvPr id="6" name="Straight Arrow Connector 5">
+            <a:extLst>
+              <a:ext uri="{FF2B5EF4-FFF2-40B4-BE49-F238E27FC236}">
+                <a16:creationId xmlns:a16="http://schemas.microsoft.com/office/drawing/2014/main" id="{A4469A79-25DF-0AE1-3C25-FEC831A2211B}"/>
+              </a:ext>
+            </a:extLst>
+          </p:cNvPr>
+          <p:cNvCxnSpPr>
+            <a:stCxn id="3" idx="3"/>
+            <a:endCxn id="4" idx="1"/>
+          </p:cNvCxnSpPr>
+          <p:nvPr/>
+        </p:nvCxnSpPr>
+        <p:spPr>
+          <a:xfrm>
+            <a:off x="6291072" y="1636776"/>
+            <a:ext cx="1609344" cy="0"/>
+          </a:xfrm>
+          <a:prstGeom prst="straightConnector1">
+            <a:avLst/>
+          </a:prstGeom>
+          <a:ln>
+            <a:tailEnd type="triangle"/>
+          </a:ln>
+        </p:spPr>
+        <p:style>
+          <a:lnRef idx="2">
+            <a:schemeClr val="accent1"/>
+          </a:lnRef>
+          <a:fillRef idx="0">
+            <a:schemeClr val="accent1"/>
+          </a:fillRef>
+          <a:effectRef idx="1">
+            <a:schemeClr val="accent1"/>
+          </a:effectRef>
+          <a:fontRef idx="minor">
+            <a:schemeClr val="tx1"/>
+          </a:fontRef>
+        </p:style>
+      </p:cxnSp>
+      <p:sp>
+        <p:nvSpPr>
+          <p:cNvPr id="7" name="Rectangle 6">
+            <a:extLst>
+              <a:ext uri="{FF2B5EF4-FFF2-40B4-BE49-F238E27FC236}">
+                <a16:creationId xmlns:a16="http://schemas.microsoft.com/office/drawing/2014/main" id="{28EA107F-FEE7-8583-79B6-1D472FE53011}"/>
+              </a:ext>
+            </a:extLst>
+          </p:cNvPr>
+          <p:cNvSpPr/>
+          <p:nvPr/>
+        </p:nvSpPr>
+        <p:spPr>
+          <a:xfrm>
+            <a:off x="7900416" y="3593592"/>
+            <a:ext cx="2194560" cy="941832"/>
+          </a:xfrm>
+          <a:prstGeom prst="rect">
+            <a:avLst/>
+          </a:prstGeom>
+        </p:spPr>
+        <p:style>
+          <a:lnRef idx="2">
+            <a:schemeClr val="accent1">
+              <a:shade val="15000"/>
+            </a:schemeClr>
+          </a:lnRef>
+          <a:fillRef idx="1">
+            <a:schemeClr val="accent1"/>
+          </a:fillRef>
+          <a:effectRef idx="0">
+            <a:schemeClr val="accent1"/>
+          </a:effectRef>
+          <a:fontRef idx="minor">
+            <a:schemeClr val="lt1"/>
+          </a:fontRef>
+        </p:style>
+        <p:txBody>
+          <a:bodyPr rtlCol="0" anchor="ctr"/>
+          <a:lstStyle/>
+          <a:p>
+            <a:pPr algn="ctr"/>
+            <a:r>
+              <a:rPr lang="en-GB" dirty="0"/>
+              <a:t>Email text</a:t>
+            </a:r>
+          </a:p>
+        </p:txBody>
+      </p:sp>
+      <p:cxnSp>
+        <p:nvCxnSpPr>
+          <p:cNvPr id="9" name="Straight Arrow Connector 8">
+            <a:extLst>
+              <a:ext uri="{FF2B5EF4-FFF2-40B4-BE49-F238E27FC236}">
+                <a16:creationId xmlns:a16="http://schemas.microsoft.com/office/drawing/2014/main" id="{95365039-BE85-F03B-F0B1-04C263D559D7}"/>
+              </a:ext>
+            </a:extLst>
+          </p:cNvPr>
+          <p:cNvCxnSpPr>
+            <a:stCxn id="4" idx="2"/>
+            <a:endCxn id="7" idx="0"/>
+          </p:cNvCxnSpPr>
+          <p:nvPr/>
+        </p:nvCxnSpPr>
+        <p:spPr>
+          <a:xfrm>
+            <a:off x="8997696" y="2002536"/>
+            <a:ext cx="0" cy="1591056"/>
+          </a:xfrm>
+          <a:prstGeom prst="straightConnector1">
+            <a:avLst/>
+          </a:prstGeom>
+          <a:ln>
+            <a:tailEnd type="triangle"/>
+          </a:ln>
+        </p:spPr>
+        <p:style>
+          <a:lnRef idx="2">
+            <a:schemeClr val="accent1"/>
+          </a:lnRef>
+          <a:fillRef idx="0">
+            <a:schemeClr val="accent1"/>
+          </a:fillRef>
+          <a:effectRef idx="1">
+            <a:schemeClr val="accent1"/>
+          </a:effectRef>
+          <a:fontRef idx="minor">
+            <a:schemeClr val="tx1"/>
+          </a:fontRef>
+        </p:style>
+      </p:cxnSp>
+      <p:sp>
+        <p:nvSpPr>
+          <p:cNvPr id="14" name="Rectangle 13">
+            <a:extLst>
+              <a:ext uri="{FF2B5EF4-FFF2-40B4-BE49-F238E27FC236}">
+                <a16:creationId xmlns:a16="http://schemas.microsoft.com/office/drawing/2014/main" id="{C134EB65-79C8-620C-1412-D0B023926275}"/>
+              </a:ext>
+            </a:extLst>
+          </p:cNvPr>
+          <p:cNvSpPr/>
+          <p:nvPr/>
+        </p:nvSpPr>
+        <p:spPr>
+          <a:xfrm>
+            <a:off x="4306824" y="3593592"/>
+            <a:ext cx="1984248" cy="941832"/>
+          </a:xfrm>
+          <a:prstGeom prst="rect">
+            <a:avLst/>
+          </a:prstGeom>
+        </p:spPr>
+        <p:style>
+          <a:lnRef idx="2">
+            <a:schemeClr val="accent1">
+              <a:shade val="15000"/>
+            </a:schemeClr>
+          </a:lnRef>
+          <a:fillRef idx="1">
+            <a:schemeClr val="accent1"/>
+          </a:fillRef>
+          <a:effectRef idx="0">
+            <a:schemeClr val="accent1"/>
+          </a:effectRef>
+          <a:fontRef idx="minor">
+            <a:schemeClr val="lt1"/>
+          </a:fontRef>
+        </p:style>
+        <p:txBody>
+          <a:bodyPr rtlCol="0" anchor="ctr"/>
+          <a:lstStyle/>
+          <a:p>
+            <a:pPr algn="ctr"/>
+            <a:r>
+              <a:rPr lang="en-GB" dirty="0"/>
+              <a:t>Text we want</a:t>
+            </a:r>
+          </a:p>
+        </p:txBody>
+      </p:sp>
+      <p:cxnSp>
+        <p:nvCxnSpPr>
+          <p:cNvPr id="16" name="Straight Arrow Connector 15">
+            <a:extLst>
+              <a:ext uri="{FF2B5EF4-FFF2-40B4-BE49-F238E27FC236}">
+                <a16:creationId xmlns:a16="http://schemas.microsoft.com/office/drawing/2014/main" id="{913A3242-D3A6-8A6B-1283-05893CB58663}"/>
+              </a:ext>
+            </a:extLst>
+          </p:cNvPr>
+          <p:cNvCxnSpPr>
+            <a:stCxn id="7" idx="1"/>
+            <a:endCxn id="14" idx="3"/>
+          </p:cNvCxnSpPr>
+          <p:nvPr/>
+        </p:nvCxnSpPr>
+        <p:spPr>
+          <a:xfrm flipH="1">
+            <a:off x="6291072" y="4064508"/>
+            <a:ext cx="1609344" cy="0"/>
+          </a:xfrm>
+          <a:prstGeom prst="straightConnector1">
+            <a:avLst/>
+          </a:prstGeom>
+          <a:ln>
+            <a:tailEnd type="triangle"/>
+          </a:ln>
+        </p:spPr>
+        <p:style>
+          <a:lnRef idx="2">
+            <a:schemeClr val="accent1"/>
+          </a:lnRef>
+          <a:fillRef idx="0">
+            <a:schemeClr val="accent1"/>
+          </a:fillRef>
+          <a:effectRef idx="1">
+            <a:schemeClr val="accent1"/>
+          </a:effectRef>
+          <a:fontRef idx="minor">
+            <a:schemeClr val="tx1"/>
+          </a:fontRef>
+        </p:style>
+      </p:cxnSp>
+      <p:sp>
+        <p:nvSpPr>
+          <p:cNvPr id="17" name="Rectangle 16">
+            <a:extLst>
+              <a:ext uri="{FF2B5EF4-FFF2-40B4-BE49-F238E27FC236}">
+                <a16:creationId xmlns:a16="http://schemas.microsoft.com/office/drawing/2014/main" id="{76F5F1E8-6EFE-3392-CBDE-A8BC907D34D6}"/>
+              </a:ext>
+            </a:extLst>
+          </p:cNvPr>
+          <p:cNvSpPr/>
+          <p:nvPr/>
+        </p:nvSpPr>
+        <p:spPr>
+          <a:xfrm>
+            <a:off x="576072" y="3593592"/>
+            <a:ext cx="2084832" cy="941832"/>
+          </a:xfrm>
+          <a:prstGeom prst="rect">
+            <a:avLst/>
+          </a:prstGeom>
+        </p:spPr>
+        <p:style>
+          <a:lnRef idx="2">
+            <a:schemeClr val="accent1">
+              <a:shade val="15000"/>
+            </a:schemeClr>
+          </a:lnRef>
+          <a:fillRef idx="1">
+            <a:schemeClr val="accent1"/>
+          </a:fillRef>
+          <a:effectRef idx="0">
+            <a:schemeClr val="accent1"/>
+          </a:effectRef>
+          <a:fontRef idx="minor">
+            <a:schemeClr val="lt1"/>
+          </a:fontRef>
+        </p:style>
+        <p:txBody>
+          <a:bodyPr rtlCol="0" anchor="ctr"/>
+          <a:lstStyle/>
+          <a:p>
+            <a:pPr algn="ctr"/>
+            <a:r>
+              <a:rPr lang="en-GB" dirty="0"/>
+              <a:t>Highlight</a:t>
+            </a:r>
+          </a:p>
+        </p:txBody>
+      </p:sp>
+      <p:cxnSp>
+        <p:nvCxnSpPr>
+          <p:cNvPr id="19" name="Straight Arrow Connector 18">
+            <a:extLst>
+              <a:ext uri="{FF2B5EF4-FFF2-40B4-BE49-F238E27FC236}">
+                <a16:creationId xmlns:a16="http://schemas.microsoft.com/office/drawing/2014/main" id="{E818EF1D-D6CE-3845-319E-C1E7C31FDA63}"/>
+              </a:ext>
+            </a:extLst>
+          </p:cNvPr>
+          <p:cNvCxnSpPr>
+            <a:stCxn id="14" idx="1"/>
+            <a:endCxn id="17" idx="3"/>
+          </p:cNvCxnSpPr>
+          <p:nvPr/>
+        </p:nvCxnSpPr>
+        <p:spPr>
+          <a:xfrm flipH="1">
+            <a:off x="2660904" y="4064508"/>
+            <a:ext cx="1645920" cy="0"/>
+          </a:xfrm>
+          <a:prstGeom prst="straightConnector1">
+            <a:avLst/>
+          </a:prstGeom>
+          <a:ln>
+            <a:tailEnd type="triangle"/>
+          </a:ln>
+        </p:spPr>
+        <p:style>
+          <a:lnRef idx="2">
+            <a:schemeClr val="accent1"/>
+          </a:lnRef>
+          <a:fillRef idx="0">
+            <a:schemeClr val="accent1"/>
+          </a:fillRef>
+          <a:effectRef idx="1">
+            <a:schemeClr val="accent1"/>
+          </a:effectRef>
+          <a:fontRef idx="minor">
+            <a:schemeClr val="tx1"/>
+          </a:fontRef>
+        </p:style>
+      </p:cxnSp>
+      <p:sp>
+        <p:nvSpPr>
+          <p:cNvPr id="26" name="TextBox 25">
+            <a:extLst>
+              <a:ext uri="{FF2B5EF4-FFF2-40B4-BE49-F238E27FC236}">
+                <a16:creationId xmlns:a16="http://schemas.microsoft.com/office/drawing/2014/main" id="{ED699248-9CFD-F064-BF65-9BEB5CF49D1C}"/>
+              </a:ext>
+            </a:extLst>
+          </p:cNvPr>
+          <p:cNvSpPr txBox="1"/>
+          <p:nvPr/>
+        </p:nvSpPr>
+        <p:spPr>
+          <a:xfrm>
+            <a:off x="10259568" y="1271016"/>
+            <a:ext cx="1243584" cy="646331"/>
+          </a:xfrm>
+          <a:prstGeom prst="rect">
+            <a:avLst/>
+          </a:prstGeom>
+          <a:noFill/>
+        </p:spPr>
+        <p:txBody>
+          <a:bodyPr wrap="square" rtlCol="0">
+            <a:spAutoFit/>
+          </a:bodyPr>
+          <a:lstStyle/>
+          <a:p>
+            <a:r>
+              <a:rPr lang="en-GB" sz="1200" dirty="0"/>
+              <a:t>Span is the html that contains email text</a:t>
+            </a:r>
+          </a:p>
+        </p:txBody>
+      </p:sp>
+      <p:sp>
+        <p:nvSpPr>
+          <p:cNvPr id="27" name="Rectangle 26">
+            <a:extLst>
+              <a:ext uri="{FF2B5EF4-FFF2-40B4-BE49-F238E27FC236}">
+                <a16:creationId xmlns:a16="http://schemas.microsoft.com/office/drawing/2014/main" id="{3DD8C56D-6F30-104C-0AC2-1A3CC42CF1C3}"/>
+              </a:ext>
+            </a:extLst>
+          </p:cNvPr>
+          <p:cNvSpPr/>
+          <p:nvPr/>
+        </p:nvSpPr>
+        <p:spPr>
+          <a:xfrm>
+            <a:off x="786384" y="1313610"/>
+            <a:ext cx="1664208" cy="646331"/>
+          </a:xfrm>
+          <a:prstGeom prst="rect">
+            <a:avLst/>
+          </a:prstGeom>
+        </p:spPr>
+        <p:style>
+          <a:lnRef idx="2">
+            <a:schemeClr val="accent1">
+              <a:shade val="15000"/>
+            </a:schemeClr>
+          </a:lnRef>
+          <a:fillRef idx="1">
+            <a:schemeClr val="accent1"/>
+          </a:fillRef>
+          <a:effectRef idx="0">
+            <a:schemeClr val="accent1"/>
+          </a:effectRef>
+          <a:fontRef idx="minor">
+            <a:schemeClr val="lt1"/>
+          </a:fontRef>
+        </p:style>
+        <p:txBody>
+          <a:bodyPr rtlCol="0" anchor="ctr"/>
+          <a:lstStyle/>
+          <a:p>
+            <a:pPr algn="ctr"/>
+            <a:r>
+              <a:rPr lang="en-GB" dirty="0"/>
+              <a:t>HREF</a:t>
+            </a:r>
+          </a:p>
+        </p:txBody>
+      </p:sp>
+      <p:cxnSp>
+        <p:nvCxnSpPr>
+          <p:cNvPr id="29" name="Straight Arrow Connector 28">
+            <a:extLst>
+              <a:ext uri="{FF2B5EF4-FFF2-40B4-BE49-F238E27FC236}">
+                <a16:creationId xmlns:a16="http://schemas.microsoft.com/office/drawing/2014/main" id="{D35AC271-605F-EE13-41CF-90CE2251AA4D}"/>
+              </a:ext>
+            </a:extLst>
+          </p:cNvPr>
+          <p:cNvCxnSpPr>
+            <a:stCxn id="3" idx="1"/>
+            <a:endCxn id="27" idx="3"/>
+          </p:cNvCxnSpPr>
+          <p:nvPr/>
+        </p:nvCxnSpPr>
+        <p:spPr>
+          <a:xfrm flipH="1">
+            <a:off x="2450592" y="1636776"/>
+            <a:ext cx="1645920" cy="0"/>
+          </a:xfrm>
+          <a:prstGeom prst="straightConnector1">
+            <a:avLst/>
+          </a:prstGeom>
+          <a:ln>
+            <a:tailEnd type="triangle"/>
+          </a:ln>
+        </p:spPr>
+        <p:style>
+          <a:lnRef idx="2">
+            <a:schemeClr val="accent1"/>
+          </a:lnRef>
+          <a:fillRef idx="0">
+            <a:schemeClr val="accent1"/>
+          </a:fillRef>
+          <a:effectRef idx="1">
+            <a:schemeClr val="accent1"/>
+          </a:effectRef>
+          <a:fontRef idx="minor">
+            <a:schemeClr val="tx1"/>
+          </a:fontRef>
+        </p:style>
+      </p:cxnSp>
+      <p:cxnSp>
+        <p:nvCxnSpPr>
+          <p:cNvPr id="34" name="Straight Arrow Connector 33">
+            <a:extLst>
+              <a:ext uri="{FF2B5EF4-FFF2-40B4-BE49-F238E27FC236}">
+                <a16:creationId xmlns:a16="http://schemas.microsoft.com/office/drawing/2014/main" id="{25148B76-9562-B2A0-BC13-BDAEDF4189B1}"/>
+              </a:ext>
+            </a:extLst>
+          </p:cNvPr>
+          <p:cNvCxnSpPr>
+            <a:cxnSpLocks/>
+            <a:stCxn id="27" idx="2"/>
+            <a:endCxn id="17" idx="0"/>
+          </p:cNvCxnSpPr>
+          <p:nvPr/>
+        </p:nvCxnSpPr>
+        <p:spPr>
+          <a:xfrm>
+            <a:off x="1618488" y="1959941"/>
+            <a:ext cx="0" cy="1633651"/>
+          </a:xfrm>
+          <a:prstGeom prst="straightConnector1">
+            <a:avLst/>
+          </a:prstGeom>
+          <a:ln>
+            <a:tailEnd type="triangle"/>
+          </a:ln>
+        </p:spPr>
+        <p:style>
+          <a:lnRef idx="2">
+            <a:schemeClr val="accent1"/>
+          </a:lnRef>
+          <a:fillRef idx="0">
+            <a:schemeClr val="accent1"/>
+          </a:fillRef>
+          <a:effectRef idx="1">
+            <a:schemeClr val="accent1"/>
+          </a:effectRef>
+          <a:fontRef idx="minor">
+            <a:schemeClr val="tx1"/>
+          </a:fontRef>
+        </p:style>
+      </p:cxnSp>
+      <p:sp>
+        <p:nvSpPr>
+          <p:cNvPr id="40" name="TextBox 39">
+            <a:extLst>
+              <a:ext uri="{FF2B5EF4-FFF2-40B4-BE49-F238E27FC236}">
+                <a16:creationId xmlns:a16="http://schemas.microsoft.com/office/drawing/2014/main" id="{7510B607-9170-BA74-C912-F3E760208681}"/>
+              </a:ext>
+            </a:extLst>
+          </p:cNvPr>
+          <p:cNvSpPr txBox="1"/>
+          <p:nvPr/>
+        </p:nvSpPr>
+        <p:spPr>
+          <a:xfrm>
+            <a:off x="1298448" y="960120"/>
+            <a:ext cx="1152144" cy="307777"/>
+          </a:xfrm>
+          <a:prstGeom prst="rect">
+            <a:avLst/>
+          </a:prstGeom>
+          <a:noFill/>
+        </p:spPr>
+        <p:txBody>
+          <a:bodyPr wrap="square" rtlCol="0">
+            <a:spAutoFit/>
+          </a:bodyPr>
+          <a:lstStyle/>
+          <a:p>
+            <a:r>
+              <a:rPr lang="en-GB" sz="1400" dirty="0" err="1"/>
+              <a:t>HyperLink</a:t>
+            </a:r>
+            <a:endParaRPr lang="en-GB" sz="1400" dirty="0"/>
+          </a:p>
+        </p:txBody>
+      </p:sp>
+      <p:sp>
+        <p:nvSpPr>
+          <p:cNvPr id="41" name="TextBox 40">
+            <a:extLst>
+              <a:ext uri="{FF2B5EF4-FFF2-40B4-BE49-F238E27FC236}">
+                <a16:creationId xmlns:a16="http://schemas.microsoft.com/office/drawing/2014/main" id="{A28CDCA3-B7E9-2AE9-2B35-586EC4C56BA6}"/>
+              </a:ext>
+            </a:extLst>
+          </p:cNvPr>
+          <p:cNvSpPr txBox="1"/>
+          <p:nvPr/>
+        </p:nvSpPr>
+        <p:spPr>
+          <a:xfrm>
+            <a:off x="6461760" y="3698749"/>
+            <a:ext cx="1356360" cy="307777"/>
+          </a:xfrm>
+          <a:prstGeom prst="rect">
+            <a:avLst/>
+          </a:prstGeom>
+          <a:noFill/>
+        </p:spPr>
+        <p:txBody>
+          <a:bodyPr wrap="square" rtlCol="0">
+            <a:spAutoFit/>
+          </a:bodyPr>
+          <a:lstStyle/>
+          <a:p>
+            <a:r>
+              <a:rPr lang="en-GB" sz="1400" dirty="0"/>
+              <a:t>Isolate the</a:t>
+            </a:r>
+          </a:p>
+        </p:txBody>
+      </p:sp>
+      <p:sp>
+        <p:nvSpPr>
+          <p:cNvPr id="42" name="TextBox 41">
+            <a:extLst>
+              <a:ext uri="{FF2B5EF4-FFF2-40B4-BE49-F238E27FC236}">
+                <a16:creationId xmlns:a16="http://schemas.microsoft.com/office/drawing/2014/main" id="{BACFE7CE-37E7-2A49-EA84-DE6EF7E3C7FF}"/>
+              </a:ext>
+            </a:extLst>
+          </p:cNvPr>
+          <p:cNvSpPr txBox="1"/>
+          <p:nvPr/>
+        </p:nvSpPr>
+        <p:spPr>
+          <a:xfrm>
+            <a:off x="2990088" y="3591027"/>
+            <a:ext cx="1243584" cy="523220"/>
+          </a:xfrm>
+          <a:prstGeom prst="rect">
+            <a:avLst/>
+          </a:prstGeom>
+          <a:noFill/>
+        </p:spPr>
+        <p:txBody>
+          <a:bodyPr wrap="square" rtlCol="0">
+            <a:spAutoFit/>
+          </a:bodyPr>
+          <a:lstStyle/>
+          <a:p>
+            <a:r>
+              <a:rPr lang="en-GB" sz="1400" dirty="0"/>
+              <a:t>Modify its html/</a:t>
+            </a:r>
+            <a:r>
+              <a:rPr lang="en-GB" sz="1400" dirty="0" err="1"/>
+              <a:t>css</a:t>
+            </a:r>
+            <a:endParaRPr lang="en-GB" sz="1400" dirty="0"/>
+          </a:p>
+        </p:txBody>
+      </p:sp>
     </p:spTree>
     <p:extLst>
       <p:ext uri="{BB962C8B-B14F-4D97-AF65-F5344CB8AC3E}">

</xml_diff>